<commit_message>
Edit figure trajectories and char
</commit_message>
<xml_diff>
--- a/changgyu_참고자료/자료.pptx
+++ b/changgyu_참고자료/자료.pptx
@@ -9,6 +9,7 @@
     <p:sldId id="258" r:id="rId3"/>
     <p:sldId id="257" r:id="rId4"/>
     <p:sldId id="260" r:id="rId5"/>
+    <p:sldId id="261" r:id="rId6"/>
   </p:sldIdLst>
   <p:sldSz cx="12192000" cy="6858000"/>
   <p:notesSz cx="6858000" cy="9144000"/>
@@ -246,7 +247,7 @@
           <a:p>
             <a:fld id="{1922C581-59D4-4B56-B830-B70E24B99D7C}" type="datetimeFigureOut">
               <a:rPr lang="ko-KR" altLang="en-US" smtClean="0"/>
-              <a:t>2018-12-26</a:t>
+              <a:t>2018-12-27</a:t>
             </a:fld>
             <a:endParaRPr lang="ko-KR" altLang="en-US"/>
           </a:p>
@@ -416,7 +417,7 @@
           <a:p>
             <a:fld id="{1922C581-59D4-4B56-B830-B70E24B99D7C}" type="datetimeFigureOut">
               <a:rPr lang="ko-KR" altLang="en-US" smtClean="0"/>
-              <a:t>2018-12-26</a:t>
+              <a:t>2018-12-27</a:t>
             </a:fld>
             <a:endParaRPr lang="ko-KR" altLang="en-US"/>
           </a:p>
@@ -596,7 +597,7 @@
           <a:p>
             <a:fld id="{1922C581-59D4-4B56-B830-B70E24B99D7C}" type="datetimeFigureOut">
               <a:rPr lang="ko-KR" altLang="en-US" smtClean="0"/>
-              <a:t>2018-12-26</a:t>
+              <a:t>2018-12-27</a:t>
             </a:fld>
             <a:endParaRPr lang="ko-KR" altLang="en-US"/>
           </a:p>
@@ -766,7 +767,7 @@
           <a:p>
             <a:fld id="{1922C581-59D4-4B56-B830-B70E24B99D7C}" type="datetimeFigureOut">
               <a:rPr lang="ko-KR" altLang="en-US" smtClean="0"/>
-              <a:t>2018-12-26</a:t>
+              <a:t>2018-12-27</a:t>
             </a:fld>
             <a:endParaRPr lang="ko-KR" altLang="en-US"/>
           </a:p>
@@ -1012,7 +1013,7 @@
           <a:p>
             <a:fld id="{1922C581-59D4-4B56-B830-B70E24B99D7C}" type="datetimeFigureOut">
               <a:rPr lang="ko-KR" altLang="en-US" smtClean="0"/>
-              <a:t>2018-12-26</a:t>
+              <a:t>2018-12-27</a:t>
             </a:fld>
             <a:endParaRPr lang="ko-KR" altLang="en-US"/>
           </a:p>
@@ -1244,7 +1245,7 @@
           <a:p>
             <a:fld id="{1922C581-59D4-4B56-B830-B70E24B99D7C}" type="datetimeFigureOut">
               <a:rPr lang="ko-KR" altLang="en-US" smtClean="0"/>
-              <a:t>2018-12-26</a:t>
+              <a:t>2018-12-27</a:t>
             </a:fld>
             <a:endParaRPr lang="ko-KR" altLang="en-US"/>
           </a:p>
@@ -1611,7 +1612,7 @@
           <a:p>
             <a:fld id="{1922C581-59D4-4B56-B830-B70E24B99D7C}" type="datetimeFigureOut">
               <a:rPr lang="ko-KR" altLang="en-US" smtClean="0"/>
-              <a:t>2018-12-26</a:t>
+              <a:t>2018-12-27</a:t>
             </a:fld>
             <a:endParaRPr lang="ko-KR" altLang="en-US"/>
           </a:p>
@@ -1729,7 +1730,7 @@
           <a:p>
             <a:fld id="{1922C581-59D4-4B56-B830-B70E24B99D7C}" type="datetimeFigureOut">
               <a:rPr lang="ko-KR" altLang="en-US" smtClean="0"/>
-              <a:t>2018-12-26</a:t>
+              <a:t>2018-12-27</a:t>
             </a:fld>
             <a:endParaRPr lang="ko-KR" altLang="en-US"/>
           </a:p>
@@ -1824,7 +1825,7 @@
           <a:p>
             <a:fld id="{1922C581-59D4-4B56-B830-B70E24B99D7C}" type="datetimeFigureOut">
               <a:rPr lang="ko-KR" altLang="en-US" smtClean="0"/>
-              <a:t>2018-12-26</a:t>
+              <a:t>2018-12-27</a:t>
             </a:fld>
             <a:endParaRPr lang="ko-KR" altLang="en-US"/>
           </a:p>
@@ -2101,7 +2102,7 @@
           <a:p>
             <a:fld id="{1922C581-59D4-4B56-B830-B70E24B99D7C}" type="datetimeFigureOut">
               <a:rPr lang="ko-KR" altLang="en-US" smtClean="0"/>
-              <a:t>2018-12-26</a:t>
+              <a:t>2018-12-27</a:t>
             </a:fld>
             <a:endParaRPr lang="ko-KR" altLang="en-US"/>
           </a:p>
@@ -2354,7 +2355,7 @@
           <a:p>
             <a:fld id="{1922C581-59D4-4B56-B830-B70E24B99D7C}" type="datetimeFigureOut">
               <a:rPr lang="ko-KR" altLang="en-US" smtClean="0"/>
-              <a:t>2018-12-26</a:t>
+              <a:t>2018-12-27</a:t>
             </a:fld>
             <a:endParaRPr lang="ko-KR" altLang="en-US"/>
           </a:p>
@@ -2567,7 +2568,7 @@
           <a:p>
             <a:fld id="{1922C581-59D4-4B56-B830-B70E24B99D7C}" type="datetimeFigureOut">
               <a:rPr lang="ko-KR" altLang="en-US" smtClean="0"/>
-              <a:t>2018-12-26</a:t>
+              <a:t>2018-12-27</a:t>
             </a:fld>
             <a:endParaRPr lang="ko-KR" altLang="en-US"/>
           </a:p>
@@ -6741,96 +6742,195 @@
           <a:chExt cx="0" cy="0"/>
         </a:xfrm>
       </p:grpSpPr>
+      <p:grpSp>
+        <p:nvGrpSpPr>
+          <p:cNvPr id="3" name="그룹 2"/>
+          <p:cNvGrpSpPr/>
+          <p:nvPr/>
+        </p:nvGrpSpPr>
+        <p:grpSpPr>
+          <a:xfrm>
+            <a:off x="3423310" y="5833242"/>
+            <a:ext cx="1073380" cy="180000"/>
+            <a:chOff x="3415862" y="5665076"/>
+            <a:chExt cx="1073380" cy="180000"/>
+          </a:xfrm>
+        </p:grpSpPr>
+        <p:sp>
+          <p:nvSpPr>
+            <p:cNvPr id="2" name="타원 1"/>
+            <p:cNvSpPr/>
+            <p:nvPr/>
+          </p:nvSpPr>
+          <p:spPr>
+            <a:xfrm>
+              <a:off x="3415862" y="5665076"/>
+              <a:ext cx="180000" cy="180000"/>
+            </a:xfrm>
+            <a:prstGeom prst="ellipse">
+              <a:avLst/>
+            </a:prstGeom>
+            <a:solidFill>
+              <a:schemeClr val="tx1"/>
+            </a:solidFill>
+            <a:ln>
+              <a:solidFill>
+                <a:schemeClr val="tx1"/>
+              </a:solidFill>
+            </a:ln>
+          </p:spPr>
+          <p:style>
+            <a:lnRef idx="2">
+              <a:schemeClr val="accent1">
+                <a:shade val="50000"/>
+              </a:schemeClr>
+            </a:lnRef>
+            <a:fillRef idx="1">
+              <a:schemeClr val="accent1"/>
+            </a:fillRef>
+            <a:effectRef idx="0">
+              <a:schemeClr val="accent1"/>
+            </a:effectRef>
+            <a:fontRef idx="minor">
+              <a:schemeClr val="lt1"/>
+            </a:fontRef>
+          </p:style>
+          <p:txBody>
+            <a:bodyPr rtlCol="0" anchor="ctr"/>
+            <a:lstStyle/>
+            <a:p>
+              <a:pPr algn="ctr"/>
+              <a:endParaRPr lang="ko-KR" altLang="en-US"/>
+            </a:p>
+          </p:txBody>
+        </p:sp>
+        <p:sp>
+          <p:nvSpPr>
+            <p:cNvPr id="8" name="타원 7"/>
+            <p:cNvSpPr/>
+            <p:nvPr/>
+          </p:nvSpPr>
+          <p:spPr>
+            <a:xfrm>
+              <a:off x="3862552" y="5665076"/>
+              <a:ext cx="180000" cy="180000"/>
+            </a:xfrm>
+            <a:prstGeom prst="ellipse">
+              <a:avLst/>
+            </a:prstGeom>
+            <a:solidFill>
+              <a:schemeClr val="tx1"/>
+            </a:solidFill>
+            <a:ln>
+              <a:solidFill>
+                <a:schemeClr val="tx1"/>
+              </a:solidFill>
+            </a:ln>
+          </p:spPr>
+          <p:style>
+            <a:lnRef idx="2">
+              <a:schemeClr val="accent1">
+                <a:shade val="50000"/>
+              </a:schemeClr>
+            </a:lnRef>
+            <a:fillRef idx="1">
+              <a:schemeClr val="accent1"/>
+            </a:fillRef>
+            <a:effectRef idx="0">
+              <a:schemeClr val="accent1"/>
+            </a:effectRef>
+            <a:fontRef idx="minor">
+              <a:schemeClr val="lt1"/>
+            </a:fontRef>
+          </p:style>
+          <p:txBody>
+            <a:bodyPr rtlCol="0" anchor="ctr"/>
+            <a:lstStyle/>
+            <a:p>
+              <a:pPr algn="ctr"/>
+              <a:endParaRPr lang="ko-KR" altLang="en-US"/>
+            </a:p>
+          </p:txBody>
+        </p:sp>
+        <p:sp>
+          <p:nvSpPr>
+            <p:cNvPr id="9" name="타원 8"/>
+            <p:cNvSpPr/>
+            <p:nvPr/>
+          </p:nvSpPr>
+          <p:spPr>
+            <a:xfrm>
+              <a:off x="4309242" y="5665076"/>
+              <a:ext cx="180000" cy="180000"/>
+            </a:xfrm>
+            <a:prstGeom prst="ellipse">
+              <a:avLst/>
+            </a:prstGeom>
+            <a:solidFill>
+              <a:schemeClr val="tx1"/>
+            </a:solidFill>
+            <a:ln>
+              <a:solidFill>
+                <a:schemeClr val="tx1"/>
+              </a:solidFill>
+            </a:ln>
+          </p:spPr>
+          <p:style>
+            <a:lnRef idx="2">
+              <a:schemeClr val="accent1">
+                <a:shade val="50000"/>
+              </a:schemeClr>
+            </a:lnRef>
+            <a:fillRef idx="1">
+              <a:schemeClr val="accent1"/>
+            </a:fillRef>
+            <a:effectRef idx="0">
+              <a:schemeClr val="accent1"/>
+            </a:effectRef>
+            <a:fontRef idx="minor">
+              <a:schemeClr val="lt1"/>
+            </a:fontRef>
+          </p:style>
+          <p:txBody>
+            <a:bodyPr rtlCol="0" anchor="ctr"/>
+            <a:lstStyle/>
+            <a:p>
+              <a:pPr algn="ctr"/>
+              <a:endParaRPr lang="ko-KR" altLang="en-US"/>
+            </a:p>
+          </p:txBody>
+        </p:sp>
+      </p:grpSp>
       <p:pic>
         <p:nvPicPr>
-          <p:cNvPr id="4" name="그림 3"/>
+          <p:cNvPr id="17" name="그림 16"/>
           <p:cNvPicPr>
-            <a:picLocks/>
+            <a:picLocks noChangeAspect="1"/>
           </p:cNvPicPr>
           <p:nvPr/>
         </p:nvPicPr>
         <p:blipFill>
-          <a:blip r:embed="rId2"/>
+          <a:blip r:embed="rId2">
+            <a:extLst>
+              <a:ext uri="{BEBA8EAE-BF5A-486C-A8C5-ECC9F3942E4B}">
+                <a14:imgProps xmlns:a14="http://schemas.microsoft.com/office/drawing/2010/main">
+                  <a14:imgLayer r:embed="rId3">
+                    <a14:imgEffect>
+                      <a14:artisticPhotocopy/>
+                    </a14:imgEffect>
+                  </a14:imgLayer>
+                </a14:imgProps>
+              </a:ext>
+            </a:extLst>
+          </a:blip>
           <a:stretch>
             <a:fillRect/>
           </a:stretch>
         </p:blipFill>
         <p:spPr>
           <a:xfrm>
-            <a:off x="720000" y="720000"/>
-            <a:ext cx="3240000" cy="2520000"/>
-          </a:xfrm>
-          <a:prstGeom prst="rect">
-            <a:avLst/>
-          </a:prstGeom>
-        </p:spPr>
-      </p:pic>
-      <p:pic>
-        <p:nvPicPr>
-          <p:cNvPr id="5" name="그림 4"/>
-          <p:cNvPicPr>
-            <a:picLocks/>
-          </p:cNvPicPr>
-          <p:nvPr/>
-        </p:nvPicPr>
-        <p:blipFill>
-          <a:blip r:embed="rId3"/>
-          <a:stretch>
-            <a:fillRect/>
-          </a:stretch>
-        </p:blipFill>
-        <p:spPr>
-          <a:xfrm>
-            <a:off x="3960000" y="720000"/>
-            <a:ext cx="3240000" cy="2520000"/>
-          </a:xfrm>
-          <a:prstGeom prst="rect">
-            <a:avLst/>
-          </a:prstGeom>
-        </p:spPr>
-      </p:pic>
-      <p:pic>
-        <p:nvPicPr>
-          <p:cNvPr id="6" name="그림 5"/>
-          <p:cNvPicPr>
-            <a:picLocks/>
-          </p:cNvPicPr>
-          <p:nvPr/>
-        </p:nvPicPr>
-        <p:blipFill>
-          <a:blip r:embed="rId4"/>
-          <a:stretch>
-            <a:fillRect/>
-          </a:stretch>
-        </p:blipFill>
-        <p:spPr>
-          <a:xfrm>
-            <a:off x="3960000" y="3240000"/>
-            <a:ext cx="3240000" cy="2520000"/>
-          </a:xfrm>
-          <a:prstGeom prst="rect">
-            <a:avLst/>
-          </a:prstGeom>
-        </p:spPr>
-      </p:pic>
-      <p:pic>
-        <p:nvPicPr>
-          <p:cNvPr id="7" name="그림 6"/>
-          <p:cNvPicPr>
-            <a:picLocks/>
-          </p:cNvPicPr>
-          <p:nvPr/>
-        </p:nvPicPr>
-        <p:blipFill>
-          <a:blip r:embed="rId5"/>
-          <a:stretch>
-            <a:fillRect/>
-          </a:stretch>
-        </p:blipFill>
-        <p:spPr>
-          <a:xfrm>
-            <a:off x="720000" y="3240000"/>
-            <a:ext cx="3240000" cy="2520000"/>
+            <a:off x="719390" y="297759"/>
+            <a:ext cx="6480610" cy="5041829"/>
           </a:xfrm>
           <a:prstGeom prst="rect">
             <a:avLst/>
@@ -6841,6 +6941,639 @@
     <p:extLst>
       <p:ext uri="{BB962C8B-B14F-4D97-AF65-F5344CB8AC3E}">
         <p14:creationId xmlns:p14="http://schemas.microsoft.com/office/powerpoint/2010/main" val="1043437216"/>
+      </p:ext>
+    </p:extLst>
+  </p:cSld>
+  <p:clrMapOvr>
+    <a:masterClrMapping/>
+  </p:clrMapOvr>
+</p:sld>
+</file>
+
+<file path=ppt/slides/slide5.xml><?xml version="1.0" encoding="utf-8"?>
+<p:sld xmlns:a="http://schemas.openxmlformats.org/drawingml/2006/main" xmlns:r="http://schemas.openxmlformats.org/officeDocument/2006/relationships" xmlns:p="http://schemas.openxmlformats.org/presentationml/2006/main">
+  <p:cSld>
+    <p:spTree>
+      <p:nvGrpSpPr>
+        <p:cNvPr id="1" name=""/>
+        <p:cNvGrpSpPr/>
+        <p:nvPr/>
+      </p:nvGrpSpPr>
+      <p:grpSpPr>
+        <a:xfrm>
+          <a:off x="0" y="0"/>
+          <a:ext cx="0" cy="0"/>
+          <a:chOff x="0" y="0"/>
+          <a:chExt cx="0" cy="0"/>
+        </a:xfrm>
+      </p:grpSpPr>
+      <p:pic>
+        <p:nvPicPr>
+          <p:cNvPr id="13" name="그림 12">
+            <a:extLst>
+              <a:ext uri="{FF2B5EF4-FFF2-40B4-BE49-F238E27FC236}">
+                <a16:creationId xmlns:a16="http://schemas.microsoft.com/office/drawing/2014/main" id="{B2393A60-942A-443D-B3E4-19AF6969E0D0}"/>
+              </a:ext>
+            </a:extLst>
+          </p:cNvPr>
+          <p:cNvPicPr>
+            <a:picLocks noChangeAspect="1"/>
+          </p:cNvPicPr>
+          <p:nvPr/>
+        </p:nvPicPr>
+        <p:blipFill>
+          <a:blip r:embed="rId2">
+            <a:extLst>
+              <a:ext uri="{28A0092B-C50C-407E-A947-70E740481C1C}">
+                <a14:useLocalDpi xmlns:a14="http://schemas.microsoft.com/office/drawing/2010/main" val="0"/>
+              </a:ext>
+            </a:extLst>
+          </a:blip>
+          <a:stretch>
+            <a:fillRect/>
+          </a:stretch>
+        </p:blipFill>
+        <p:spPr>
+          <a:xfrm>
+            <a:off x="4108810" y="1935838"/>
+            <a:ext cx="3974380" cy="2986323"/>
+          </a:xfrm>
+          <a:prstGeom prst="rect">
+            <a:avLst/>
+          </a:prstGeom>
+        </p:spPr>
+      </p:pic>
+      <p:sp>
+        <p:nvSpPr>
+          <p:cNvPr id="14" name="타원 13"/>
+          <p:cNvSpPr/>
+          <p:nvPr/>
+        </p:nvSpPr>
+        <p:spPr>
+          <a:xfrm>
+            <a:off x="5866592" y="3518615"/>
+            <a:ext cx="795674" cy="795674"/>
+          </a:xfrm>
+          <a:prstGeom prst="ellipse">
+            <a:avLst/>
+          </a:prstGeom>
+          <a:noFill/>
+          <a:ln w="38100">
+            <a:solidFill>
+              <a:schemeClr val="tx1"/>
+            </a:solidFill>
+          </a:ln>
+        </p:spPr>
+        <p:style>
+          <a:lnRef idx="2">
+            <a:schemeClr val="accent1">
+              <a:shade val="50000"/>
+            </a:schemeClr>
+          </a:lnRef>
+          <a:fillRef idx="1">
+            <a:schemeClr val="accent1"/>
+          </a:fillRef>
+          <a:effectRef idx="0">
+            <a:schemeClr val="accent1"/>
+          </a:effectRef>
+          <a:fontRef idx="minor">
+            <a:schemeClr val="lt1"/>
+          </a:fontRef>
+        </p:style>
+        <p:txBody>
+          <a:bodyPr rtlCol="0" anchor="ctr"/>
+          <a:lstStyle>
+            <a:defPPr>
+              <a:defRPr lang="ko-KR"/>
+            </a:defPPr>
+            <a:lvl1pPr marL="0" algn="l" defTabSz="914400" rtl="0" eaLnBrk="1" latinLnBrk="1" hangingPunct="1">
+              <a:defRPr sz="1800" kern="1200">
+                <a:solidFill>
+                  <a:schemeClr val="lt1"/>
+                </a:solidFill>
+                <a:latin typeface="+mn-lt"/>
+                <a:ea typeface="+mn-ea"/>
+                <a:cs typeface="+mn-cs"/>
+              </a:defRPr>
+            </a:lvl1pPr>
+            <a:lvl2pPr marL="457200" algn="l" defTabSz="914400" rtl="0" eaLnBrk="1" latinLnBrk="1" hangingPunct="1">
+              <a:defRPr sz="1800" kern="1200">
+                <a:solidFill>
+                  <a:schemeClr val="lt1"/>
+                </a:solidFill>
+                <a:latin typeface="+mn-lt"/>
+                <a:ea typeface="+mn-ea"/>
+                <a:cs typeface="+mn-cs"/>
+              </a:defRPr>
+            </a:lvl2pPr>
+            <a:lvl3pPr marL="914400" algn="l" defTabSz="914400" rtl="0" eaLnBrk="1" latinLnBrk="1" hangingPunct="1">
+              <a:defRPr sz="1800" kern="1200">
+                <a:solidFill>
+                  <a:schemeClr val="lt1"/>
+                </a:solidFill>
+                <a:latin typeface="+mn-lt"/>
+                <a:ea typeface="+mn-ea"/>
+                <a:cs typeface="+mn-cs"/>
+              </a:defRPr>
+            </a:lvl3pPr>
+            <a:lvl4pPr marL="1371600" algn="l" defTabSz="914400" rtl="0" eaLnBrk="1" latinLnBrk="1" hangingPunct="1">
+              <a:defRPr sz="1800" kern="1200">
+                <a:solidFill>
+                  <a:schemeClr val="lt1"/>
+                </a:solidFill>
+                <a:latin typeface="+mn-lt"/>
+                <a:ea typeface="+mn-ea"/>
+                <a:cs typeface="+mn-cs"/>
+              </a:defRPr>
+            </a:lvl4pPr>
+            <a:lvl5pPr marL="1828800" algn="l" defTabSz="914400" rtl="0" eaLnBrk="1" latinLnBrk="1" hangingPunct="1">
+              <a:defRPr sz="1800" kern="1200">
+                <a:solidFill>
+                  <a:schemeClr val="lt1"/>
+                </a:solidFill>
+                <a:latin typeface="+mn-lt"/>
+                <a:ea typeface="+mn-ea"/>
+                <a:cs typeface="+mn-cs"/>
+              </a:defRPr>
+            </a:lvl5pPr>
+            <a:lvl6pPr marL="2286000" algn="l" defTabSz="914400" rtl="0" eaLnBrk="1" latinLnBrk="1" hangingPunct="1">
+              <a:defRPr sz="1800" kern="1200">
+                <a:solidFill>
+                  <a:schemeClr val="lt1"/>
+                </a:solidFill>
+                <a:latin typeface="+mn-lt"/>
+                <a:ea typeface="+mn-ea"/>
+                <a:cs typeface="+mn-cs"/>
+              </a:defRPr>
+            </a:lvl6pPr>
+            <a:lvl7pPr marL="2743200" algn="l" defTabSz="914400" rtl="0" eaLnBrk="1" latinLnBrk="1" hangingPunct="1">
+              <a:defRPr sz="1800" kern="1200">
+                <a:solidFill>
+                  <a:schemeClr val="lt1"/>
+                </a:solidFill>
+                <a:latin typeface="+mn-lt"/>
+                <a:ea typeface="+mn-ea"/>
+                <a:cs typeface="+mn-cs"/>
+              </a:defRPr>
+            </a:lvl7pPr>
+            <a:lvl8pPr marL="3200400" algn="l" defTabSz="914400" rtl="0" eaLnBrk="1" latinLnBrk="1" hangingPunct="1">
+              <a:defRPr sz="1800" kern="1200">
+                <a:solidFill>
+                  <a:schemeClr val="lt1"/>
+                </a:solidFill>
+                <a:latin typeface="+mn-lt"/>
+                <a:ea typeface="+mn-ea"/>
+                <a:cs typeface="+mn-cs"/>
+              </a:defRPr>
+            </a:lvl8pPr>
+            <a:lvl9pPr marL="3657600" algn="l" defTabSz="914400" rtl="0" eaLnBrk="1" latinLnBrk="1" hangingPunct="1">
+              <a:defRPr sz="1800" kern="1200">
+                <a:solidFill>
+                  <a:schemeClr val="lt1"/>
+                </a:solidFill>
+                <a:latin typeface="+mn-lt"/>
+                <a:ea typeface="+mn-ea"/>
+                <a:cs typeface="+mn-cs"/>
+              </a:defRPr>
+            </a:lvl9pPr>
+          </a:lstStyle>
+          <a:p>
+            <a:pPr algn="ctr"/>
+            <a:endParaRPr lang="ko-KR" altLang="en-US">
+              <a:latin typeface="배달의민족 주아" panose="02020603020101020101" pitchFamily="18" charset="-127"/>
+              <a:ea typeface="배달의민족 주아" panose="02020603020101020101" pitchFamily="18" charset="-127"/>
+            </a:endParaRPr>
+          </a:p>
+        </p:txBody>
+      </p:sp>
+      <p:sp>
+        <p:nvSpPr>
+          <p:cNvPr id="21" name="TextBox 6"/>
+          <p:cNvSpPr txBox="1"/>
+          <p:nvPr/>
+        </p:nvSpPr>
+        <p:spPr>
+          <a:xfrm>
+            <a:off x="4041674" y="2370673"/>
+            <a:ext cx="1582421" cy="307777"/>
+          </a:xfrm>
+          <a:prstGeom prst="rect">
+            <a:avLst/>
+          </a:prstGeom>
+          <a:noFill/>
+          <a:ln>
+            <a:noFill/>
+          </a:ln>
+        </p:spPr>
+        <p:txBody>
+          <a:bodyPr wrap="none" rtlCol="0">
+            <a:spAutoFit/>
+          </a:bodyPr>
+          <a:lstStyle>
+            <a:defPPr>
+              <a:defRPr lang="ko-KR"/>
+            </a:defPPr>
+            <a:lvl1pPr marL="0" algn="l" defTabSz="914400" rtl="0" eaLnBrk="1" latinLnBrk="1" hangingPunct="1">
+              <a:defRPr sz="1800" kern="1200">
+                <a:solidFill>
+                  <a:schemeClr val="tx1"/>
+                </a:solidFill>
+                <a:latin typeface="+mn-lt"/>
+                <a:ea typeface="+mn-ea"/>
+                <a:cs typeface="+mn-cs"/>
+              </a:defRPr>
+            </a:lvl1pPr>
+            <a:lvl2pPr marL="457200" algn="l" defTabSz="914400" rtl="0" eaLnBrk="1" latinLnBrk="1" hangingPunct="1">
+              <a:defRPr sz="1800" kern="1200">
+                <a:solidFill>
+                  <a:schemeClr val="tx1"/>
+                </a:solidFill>
+                <a:latin typeface="+mn-lt"/>
+                <a:ea typeface="+mn-ea"/>
+                <a:cs typeface="+mn-cs"/>
+              </a:defRPr>
+            </a:lvl2pPr>
+            <a:lvl3pPr marL="914400" algn="l" defTabSz="914400" rtl="0" eaLnBrk="1" latinLnBrk="1" hangingPunct="1">
+              <a:defRPr sz="1800" kern="1200">
+                <a:solidFill>
+                  <a:schemeClr val="tx1"/>
+                </a:solidFill>
+                <a:latin typeface="+mn-lt"/>
+                <a:ea typeface="+mn-ea"/>
+                <a:cs typeface="+mn-cs"/>
+              </a:defRPr>
+            </a:lvl3pPr>
+            <a:lvl4pPr marL="1371600" algn="l" defTabSz="914400" rtl="0" eaLnBrk="1" latinLnBrk="1" hangingPunct="1">
+              <a:defRPr sz="1800" kern="1200">
+                <a:solidFill>
+                  <a:schemeClr val="tx1"/>
+                </a:solidFill>
+                <a:latin typeface="+mn-lt"/>
+                <a:ea typeface="+mn-ea"/>
+                <a:cs typeface="+mn-cs"/>
+              </a:defRPr>
+            </a:lvl4pPr>
+            <a:lvl5pPr marL="1828800" algn="l" defTabSz="914400" rtl="0" eaLnBrk="1" latinLnBrk="1" hangingPunct="1">
+              <a:defRPr sz="1800" kern="1200">
+                <a:solidFill>
+                  <a:schemeClr val="tx1"/>
+                </a:solidFill>
+                <a:latin typeface="+mn-lt"/>
+                <a:ea typeface="+mn-ea"/>
+                <a:cs typeface="+mn-cs"/>
+              </a:defRPr>
+            </a:lvl5pPr>
+            <a:lvl6pPr marL="2286000" algn="l" defTabSz="914400" rtl="0" eaLnBrk="1" latinLnBrk="1" hangingPunct="1">
+              <a:defRPr sz="1800" kern="1200">
+                <a:solidFill>
+                  <a:schemeClr val="tx1"/>
+                </a:solidFill>
+                <a:latin typeface="+mn-lt"/>
+                <a:ea typeface="+mn-ea"/>
+                <a:cs typeface="+mn-cs"/>
+              </a:defRPr>
+            </a:lvl6pPr>
+            <a:lvl7pPr marL="2743200" algn="l" defTabSz="914400" rtl="0" eaLnBrk="1" latinLnBrk="1" hangingPunct="1">
+              <a:defRPr sz="1800" kern="1200">
+                <a:solidFill>
+                  <a:schemeClr val="tx1"/>
+                </a:solidFill>
+                <a:latin typeface="+mn-lt"/>
+                <a:ea typeface="+mn-ea"/>
+                <a:cs typeface="+mn-cs"/>
+              </a:defRPr>
+            </a:lvl7pPr>
+            <a:lvl8pPr marL="3200400" algn="l" defTabSz="914400" rtl="0" eaLnBrk="1" latinLnBrk="1" hangingPunct="1">
+              <a:defRPr sz="1800" kern="1200">
+                <a:solidFill>
+                  <a:schemeClr val="tx1"/>
+                </a:solidFill>
+                <a:latin typeface="+mn-lt"/>
+                <a:ea typeface="+mn-ea"/>
+                <a:cs typeface="+mn-cs"/>
+              </a:defRPr>
+            </a:lvl8pPr>
+            <a:lvl9pPr marL="3657600" algn="l" defTabSz="914400" rtl="0" eaLnBrk="1" latinLnBrk="1" hangingPunct="1">
+              <a:defRPr sz="1800" kern="1200">
+                <a:solidFill>
+                  <a:schemeClr val="tx1"/>
+                </a:solidFill>
+                <a:latin typeface="+mn-lt"/>
+                <a:ea typeface="+mn-ea"/>
+                <a:cs typeface="+mn-cs"/>
+              </a:defRPr>
+            </a:lvl9pPr>
+          </a:lstStyle>
+          <a:p>
+            <a:pPr algn="ctr"/>
+            <a:r>
+              <a:rPr lang="en-US" altLang="ko-KR" sz="1400" b="1" dirty="0" smtClean="0">
+                <a:solidFill>
+                  <a:srgbClr val="002060"/>
+                </a:solidFill>
+                <a:latin typeface="Times New Roman" panose="02020603050405020304" pitchFamily="18" charset="0"/>
+                <a:ea typeface="배달의민족 주아" panose="02020603020101020101" pitchFamily="18" charset="-127"/>
+                <a:cs typeface="Times New Roman" panose="02020603050405020304" pitchFamily="18" charset="0"/>
+              </a:rPr>
+              <a:t>Anchor Node(AN)</a:t>
+            </a:r>
+            <a:endParaRPr lang="ko-KR" altLang="en-US" sz="1400" b="1" dirty="0">
+              <a:solidFill>
+                <a:srgbClr val="002060"/>
+              </a:solidFill>
+              <a:latin typeface="Times New Roman" panose="02020603050405020304" pitchFamily="18" charset="0"/>
+              <a:ea typeface="배달의민족 주아" panose="02020603020101020101" pitchFamily="18" charset="-127"/>
+              <a:cs typeface="Times New Roman" panose="02020603050405020304" pitchFamily="18" charset="0"/>
+            </a:endParaRPr>
+          </a:p>
+        </p:txBody>
+      </p:sp>
+      <p:sp>
+        <p:nvSpPr>
+          <p:cNvPr id="16" name="타원 15"/>
+          <p:cNvSpPr/>
+          <p:nvPr/>
+        </p:nvSpPr>
+        <p:spPr>
+          <a:xfrm>
+            <a:off x="4258387" y="2694832"/>
+            <a:ext cx="795674" cy="795674"/>
+          </a:xfrm>
+          <a:prstGeom prst="ellipse">
+            <a:avLst/>
+          </a:prstGeom>
+          <a:noFill/>
+          <a:ln w="38100">
+            <a:solidFill>
+              <a:srgbClr val="002060"/>
+            </a:solidFill>
+          </a:ln>
+        </p:spPr>
+        <p:style>
+          <a:lnRef idx="2">
+            <a:schemeClr val="accent1">
+              <a:shade val="50000"/>
+            </a:schemeClr>
+          </a:lnRef>
+          <a:fillRef idx="1">
+            <a:schemeClr val="accent1"/>
+          </a:fillRef>
+          <a:effectRef idx="0">
+            <a:schemeClr val="accent1"/>
+          </a:effectRef>
+          <a:fontRef idx="minor">
+            <a:schemeClr val="lt1"/>
+          </a:fontRef>
+        </p:style>
+        <p:txBody>
+          <a:bodyPr rtlCol="0" anchor="ctr"/>
+          <a:lstStyle>
+            <a:defPPr>
+              <a:defRPr lang="ko-KR"/>
+            </a:defPPr>
+            <a:lvl1pPr marL="0" algn="l" defTabSz="914400" rtl="0" eaLnBrk="1" latinLnBrk="1" hangingPunct="1">
+              <a:defRPr sz="1800" kern="1200">
+                <a:solidFill>
+                  <a:schemeClr val="lt1"/>
+                </a:solidFill>
+                <a:latin typeface="+mn-lt"/>
+                <a:ea typeface="+mn-ea"/>
+                <a:cs typeface="+mn-cs"/>
+              </a:defRPr>
+            </a:lvl1pPr>
+            <a:lvl2pPr marL="457200" algn="l" defTabSz="914400" rtl="0" eaLnBrk="1" latinLnBrk="1" hangingPunct="1">
+              <a:defRPr sz="1800" kern="1200">
+                <a:solidFill>
+                  <a:schemeClr val="lt1"/>
+                </a:solidFill>
+                <a:latin typeface="+mn-lt"/>
+                <a:ea typeface="+mn-ea"/>
+                <a:cs typeface="+mn-cs"/>
+              </a:defRPr>
+            </a:lvl2pPr>
+            <a:lvl3pPr marL="914400" algn="l" defTabSz="914400" rtl="0" eaLnBrk="1" latinLnBrk="1" hangingPunct="1">
+              <a:defRPr sz="1800" kern="1200">
+                <a:solidFill>
+                  <a:schemeClr val="lt1"/>
+                </a:solidFill>
+                <a:latin typeface="+mn-lt"/>
+                <a:ea typeface="+mn-ea"/>
+                <a:cs typeface="+mn-cs"/>
+              </a:defRPr>
+            </a:lvl3pPr>
+            <a:lvl4pPr marL="1371600" algn="l" defTabSz="914400" rtl="0" eaLnBrk="1" latinLnBrk="1" hangingPunct="1">
+              <a:defRPr sz="1800" kern="1200">
+                <a:solidFill>
+                  <a:schemeClr val="lt1"/>
+                </a:solidFill>
+                <a:latin typeface="+mn-lt"/>
+                <a:ea typeface="+mn-ea"/>
+                <a:cs typeface="+mn-cs"/>
+              </a:defRPr>
+            </a:lvl4pPr>
+            <a:lvl5pPr marL="1828800" algn="l" defTabSz="914400" rtl="0" eaLnBrk="1" latinLnBrk="1" hangingPunct="1">
+              <a:defRPr sz="1800" kern="1200">
+                <a:solidFill>
+                  <a:schemeClr val="lt1"/>
+                </a:solidFill>
+                <a:latin typeface="+mn-lt"/>
+                <a:ea typeface="+mn-ea"/>
+                <a:cs typeface="+mn-cs"/>
+              </a:defRPr>
+            </a:lvl5pPr>
+            <a:lvl6pPr marL="2286000" algn="l" defTabSz="914400" rtl="0" eaLnBrk="1" latinLnBrk="1" hangingPunct="1">
+              <a:defRPr sz="1800" kern="1200">
+                <a:solidFill>
+                  <a:schemeClr val="lt1"/>
+                </a:solidFill>
+                <a:latin typeface="+mn-lt"/>
+                <a:ea typeface="+mn-ea"/>
+                <a:cs typeface="+mn-cs"/>
+              </a:defRPr>
+            </a:lvl6pPr>
+            <a:lvl7pPr marL="2743200" algn="l" defTabSz="914400" rtl="0" eaLnBrk="1" latinLnBrk="1" hangingPunct="1">
+              <a:defRPr sz="1800" kern="1200">
+                <a:solidFill>
+                  <a:schemeClr val="lt1"/>
+                </a:solidFill>
+                <a:latin typeface="+mn-lt"/>
+                <a:ea typeface="+mn-ea"/>
+                <a:cs typeface="+mn-cs"/>
+              </a:defRPr>
+            </a:lvl7pPr>
+            <a:lvl8pPr marL="3200400" algn="l" defTabSz="914400" rtl="0" eaLnBrk="1" latinLnBrk="1" hangingPunct="1">
+              <a:defRPr sz="1800" kern="1200">
+                <a:solidFill>
+                  <a:schemeClr val="lt1"/>
+                </a:solidFill>
+                <a:latin typeface="+mn-lt"/>
+                <a:ea typeface="+mn-ea"/>
+                <a:cs typeface="+mn-cs"/>
+              </a:defRPr>
+            </a:lvl8pPr>
+            <a:lvl9pPr marL="3657600" algn="l" defTabSz="914400" rtl="0" eaLnBrk="1" latinLnBrk="1" hangingPunct="1">
+              <a:defRPr sz="1800" kern="1200">
+                <a:solidFill>
+                  <a:schemeClr val="lt1"/>
+                </a:solidFill>
+                <a:latin typeface="+mn-lt"/>
+                <a:ea typeface="+mn-ea"/>
+                <a:cs typeface="+mn-cs"/>
+              </a:defRPr>
+            </a:lvl9pPr>
+          </a:lstStyle>
+          <a:p>
+            <a:pPr algn="ctr"/>
+            <a:endParaRPr lang="ko-KR" altLang="en-US">
+              <a:solidFill>
+                <a:srgbClr val="002060"/>
+              </a:solidFill>
+              <a:latin typeface="배달의민족 주아" panose="02020603020101020101" pitchFamily="18" charset="-127"/>
+              <a:ea typeface="배달의민족 주아" panose="02020603020101020101" pitchFamily="18" charset="-127"/>
+            </a:endParaRPr>
+          </a:p>
+        </p:txBody>
+      </p:sp>
+      <p:sp>
+        <p:nvSpPr>
+          <p:cNvPr id="19" name="TextBox 13"/>
+          <p:cNvSpPr txBox="1"/>
+          <p:nvPr/>
+        </p:nvSpPr>
+        <p:spPr>
+          <a:xfrm>
+            <a:off x="5624095" y="4314289"/>
+            <a:ext cx="1280672" cy="307777"/>
+          </a:xfrm>
+          <a:prstGeom prst="rect">
+            <a:avLst/>
+          </a:prstGeom>
+          <a:noFill/>
+          <a:ln>
+            <a:noFill/>
+          </a:ln>
+        </p:spPr>
+        <p:txBody>
+          <a:bodyPr wrap="none" rtlCol="0">
+            <a:spAutoFit/>
+          </a:bodyPr>
+          <a:lstStyle>
+            <a:defPPr>
+              <a:defRPr lang="ko-KR"/>
+            </a:defPPr>
+            <a:lvl1pPr marL="0" algn="l" defTabSz="914400" rtl="0" eaLnBrk="1" latinLnBrk="1" hangingPunct="1">
+              <a:defRPr sz="1800" kern="1200">
+                <a:solidFill>
+                  <a:schemeClr val="tx1"/>
+                </a:solidFill>
+                <a:latin typeface="+mn-lt"/>
+                <a:ea typeface="+mn-ea"/>
+                <a:cs typeface="+mn-cs"/>
+              </a:defRPr>
+            </a:lvl1pPr>
+            <a:lvl2pPr marL="457200" algn="l" defTabSz="914400" rtl="0" eaLnBrk="1" latinLnBrk="1" hangingPunct="1">
+              <a:defRPr sz="1800" kern="1200">
+                <a:solidFill>
+                  <a:schemeClr val="tx1"/>
+                </a:solidFill>
+                <a:latin typeface="+mn-lt"/>
+                <a:ea typeface="+mn-ea"/>
+                <a:cs typeface="+mn-cs"/>
+              </a:defRPr>
+            </a:lvl2pPr>
+            <a:lvl3pPr marL="914400" algn="l" defTabSz="914400" rtl="0" eaLnBrk="1" latinLnBrk="1" hangingPunct="1">
+              <a:defRPr sz="1800" kern="1200">
+                <a:solidFill>
+                  <a:schemeClr val="tx1"/>
+                </a:solidFill>
+                <a:latin typeface="+mn-lt"/>
+                <a:ea typeface="+mn-ea"/>
+                <a:cs typeface="+mn-cs"/>
+              </a:defRPr>
+            </a:lvl3pPr>
+            <a:lvl4pPr marL="1371600" algn="l" defTabSz="914400" rtl="0" eaLnBrk="1" latinLnBrk="1" hangingPunct="1">
+              <a:defRPr sz="1800" kern="1200">
+                <a:solidFill>
+                  <a:schemeClr val="tx1"/>
+                </a:solidFill>
+                <a:latin typeface="+mn-lt"/>
+                <a:ea typeface="+mn-ea"/>
+                <a:cs typeface="+mn-cs"/>
+              </a:defRPr>
+            </a:lvl4pPr>
+            <a:lvl5pPr marL="1828800" algn="l" defTabSz="914400" rtl="0" eaLnBrk="1" latinLnBrk="1" hangingPunct="1">
+              <a:defRPr sz="1800" kern="1200">
+                <a:solidFill>
+                  <a:schemeClr val="tx1"/>
+                </a:solidFill>
+                <a:latin typeface="+mn-lt"/>
+                <a:ea typeface="+mn-ea"/>
+                <a:cs typeface="+mn-cs"/>
+              </a:defRPr>
+            </a:lvl5pPr>
+            <a:lvl6pPr marL="2286000" algn="l" defTabSz="914400" rtl="0" eaLnBrk="1" latinLnBrk="1" hangingPunct="1">
+              <a:defRPr sz="1800" kern="1200">
+                <a:solidFill>
+                  <a:schemeClr val="tx1"/>
+                </a:solidFill>
+                <a:latin typeface="+mn-lt"/>
+                <a:ea typeface="+mn-ea"/>
+                <a:cs typeface="+mn-cs"/>
+              </a:defRPr>
+            </a:lvl6pPr>
+            <a:lvl7pPr marL="2743200" algn="l" defTabSz="914400" rtl="0" eaLnBrk="1" latinLnBrk="1" hangingPunct="1">
+              <a:defRPr sz="1800" kern="1200">
+                <a:solidFill>
+                  <a:schemeClr val="tx1"/>
+                </a:solidFill>
+                <a:latin typeface="+mn-lt"/>
+                <a:ea typeface="+mn-ea"/>
+                <a:cs typeface="+mn-cs"/>
+              </a:defRPr>
+            </a:lvl7pPr>
+            <a:lvl8pPr marL="3200400" algn="l" defTabSz="914400" rtl="0" eaLnBrk="1" latinLnBrk="1" hangingPunct="1">
+              <a:defRPr sz="1800" kern="1200">
+                <a:solidFill>
+                  <a:schemeClr val="tx1"/>
+                </a:solidFill>
+                <a:latin typeface="+mn-lt"/>
+                <a:ea typeface="+mn-ea"/>
+                <a:cs typeface="+mn-cs"/>
+              </a:defRPr>
+            </a:lvl8pPr>
+            <a:lvl9pPr marL="3657600" algn="l" defTabSz="914400" rtl="0" eaLnBrk="1" latinLnBrk="1" hangingPunct="1">
+              <a:defRPr sz="1800" kern="1200">
+                <a:solidFill>
+                  <a:schemeClr val="tx1"/>
+                </a:solidFill>
+                <a:latin typeface="+mn-lt"/>
+                <a:ea typeface="+mn-ea"/>
+                <a:cs typeface="+mn-cs"/>
+              </a:defRPr>
+            </a:lvl9pPr>
+          </a:lstStyle>
+          <a:p>
+            <a:pPr algn="ctr"/>
+            <a:r>
+              <a:rPr lang="en-US" altLang="ko-KR" sz="1400" b="1" dirty="0" smtClean="0">
+                <a:latin typeface="Times New Roman" panose="02020603050405020304" pitchFamily="18" charset="0"/>
+                <a:ea typeface="배달의민족 주아" panose="02020603020101020101" pitchFamily="18" charset="-127"/>
+                <a:cs typeface="Times New Roman" panose="02020603050405020304" pitchFamily="18" charset="0"/>
+              </a:rPr>
+              <a:t>Tag Node(TN)</a:t>
+            </a:r>
+            <a:endParaRPr lang="ko-KR" altLang="en-US" sz="1400" b="1" dirty="0">
+              <a:latin typeface="Times New Roman" panose="02020603050405020304" pitchFamily="18" charset="0"/>
+              <a:ea typeface="배달의민족 주아" panose="02020603020101020101" pitchFamily="18" charset="-127"/>
+              <a:cs typeface="Times New Roman" panose="02020603050405020304" pitchFamily="18" charset="0"/>
+            </a:endParaRPr>
+          </a:p>
+        </p:txBody>
+      </p:sp>
+    </p:spTree>
+    <p:extLst>
+      <p:ext uri="{BB962C8B-B14F-4D97-AF65-F5344CB8AC3E}">
+        <p14:creationId xmlns:p14="http://schemas.microsoft.com/office/powerpoint/2010/main" val="479943556"/>
       </p:ext>
     </p:extLst>
   </p:cSld>

</xml_diff>

<commit_message>
modify figure to eps
</commit_message>
<xml_diff>
--- a/changgyu_참고자료/자료.pptx
+++ b/changgyu_참고자료/자료.pptx
@@ -7,9 +7,7 @@
   <p:sldIdLst>
     <p:sldId id="256" r:id="rId2"/>
     <p:sldId id="258" r:id="rId3"/>
-    <p:sldId id="257" r:id="rId4"/>
-    <p:sldId id="260" r:id="rId5"/>
-    <p:sldId id="261" r:id="rId6"/>
+    <p:sldId id="261" r:id="rId4"/>
   </p:sldIdLst>
   <p:sldSz cx="9144000" cy="6858000" type="screen4x3"/>
   <p:notesSz cx="6858000" cy="9144000"/>
@@ -247,7 +245,7 @@
           <a:p>
             <a:fld id="{1922C581-59D4-4B56-B830-B70E24B99D7C}" type="datetimeFigureOut">
               <a:rPr lang="ko-KR" altLang="en-US" smtClean="0"/>
-              <a:t>2019-01-04</a:t>
+              <a:t>2019-01-06</a:t>
             </a:fld>
             <a:endParaRPr lang="ko-KR" altLang="en-US"/>
           </a:p>
@@ -417,7 +415,7 @@
           <a:p>
             <a:fld id="{1922C581-59D4-4B56-B830-B70E24B99D7C}" type="datetimeFigureOut">
               <a:rPr lang="ko-KR" altLang="en-US" smtClean="0"/>
-              <a:t>2019-01-04</a:t>
+              <a:t>2019-01-06</a:t>
             </a:fld>
             <a:endParaRPr lang="ko-KR" altLang="en-US"/>
           </a:p>
@@ -597,7 +595,7 @@
           <a:p>
             <a:fld id="{1922C581-59D4-4B56-B830-B70E24B99D7C}" type="datetimeFigureOut">
               <a:rPr lang="ko-KR" altLang="en-US" smtClean="0"/>
-              <a:t>2019-01-04</a:t>
+              <a:t>2019-01-06</a:t>
             </a:fld>
             <a:endParaRPr lang="ko-KR" altLang="en-US"/>
           </a:p>
@@ -767,7 +765,7 @@
           <a:p>
             <a:fld id="{1922C581-59D4-4B56-B830-B70E24B99D7C}" type="datetimeFigureOut">
               <a:rPr lang="ko-KR" altLang="en-US" smtClean="0"/>
-              <a:t>2019-01-04</a:t>
+              <a:t>2019-01-06</a:t>
             </a:fld>
             <a:endParaRPr lang="ko-KR" altLang="en-US"/>
           </a:p>
@@ -1011,7 +1009,7 @@
           <a:p>
             <a:fld id="{1922C581-59D4-4B56-B830-B70E24B99D7C}" type="datetimeFigureOut">
               <a:rPr lang="ko-KR" altLang="en-US" smtClean="0"/>
-              <a:t>2019-01-04</a:t>
+              <a:t>2019-01-06</a:t>
             </a:fld>
             <a:endParaRPr lang="ko-KR" altLang="en-US"/>
           </a:p>
@@ -1243,7 +1241,7 @@
           <a:p>
             <a:fld id="{1922C581-59D4-4B56-B830-B70E24B99D7C}" type="datetimeFigureOut">
               <a:rPr lang="ko-KR" altLang="en-US" smtClean="0"/>
-              <a:t>2019-01-04</a:t>
+              <a:t>2019-01-06</a:t>
             </a:fld>
             <a:endParaRPr lang="ko-KR" altLang="en-US"/>
           </a:p>
@@ -1610,7 +1608,7 @@
           <a:p>
             <a:fld id="{1922C581-59D4-4B56-B830-B70E24B99D7C}" type="datetimeFigureOut">
               <a:rPr lang="ko-KR" altLang="en-US" smtClean="0"/>
-              <a:t>2019-01-04</a:t>
+              <a:t>2019-01-06</a:t>
             </a:fld>
             <a:endParaRPr lang="ko-KR" altLang="en-US"/>
           </a:p>
@@ -1728,7 +1726,7 @@
           <a:p>
             <a:fld id="{1922C581-59D4-4B56-B830-B70E24B99D7C}" type="datetimeFigureOut">
               <a:rPr lang="ko-KR" altLang="en-US" smtClean="0"/>
-              <a:t>2019-01-04</a:t>
+              <a:t>2019-01-06</a:t>
             </a:fld>
             <a:endParaRPr lang="ko-KR" altLang="en-US"/>
           </a:p>
@@ -1823,7 +1821,7 @@
           <a:p>
             <a:fld id="{1922C581-59D4-4B56-B830-B70E24B99D7C}" type="datetimeFigureOut">
               <a:rPr lang="ko-KR" altLang="en-US" smtClean="0"/>
-              <a:t>2019-01-04</a:t>
+              <a:t>2019-01-06</a:t>
             </a:fld>
             <a:endParaRPr lang="ko-KR" altLang="en-US"/>
           </a:p>
@@ -2100,7 +2098,7 @@
           <a:p>
             <a:fld id="{1922C581-59D4-4B56-B830-B70E24B99D7C}" type="datetimeFigureOut">
               <a:rPr lang="ko-KR" altLang="en-US" smtClean="0"/>
-              <a:t>2019-01-04</a:t>
+              <a:t>2019-01-06</a:t>
             </a:fld>
             <a:endParaRPr lang="ko-KR" altLang="en-US"/>
           </a:p>
@@ -2357,7 +2355,7 @@
           <a:p>
             <a:fld id="{1922C581-59D4-4B56-B830-B70E24B99D7C}" type="datetimeFigureOut">
               <a:rPr lang="ko-KR" altLang="en-US" smtClean="0"/>
-              <a:t>2019-01-04</a:t>
+              <a:t>2019-01-06</a:t>
             </a:fld>
             <a:endParaRPr lang="ko-KR" altLang="en-US"/>
           </a:p>
@@ -2570,7 +2568,7 @@
           <a:p>
             <a:fld id="{1922C581-59D4-4B56-B830-B70E24B99D7C}" type="datetimeFigureOut">
               <a:rPr lang="ko-KR" altLang="en-US" smtClean="0"/>
-              <a:t>2019-01-04</a:t>
+              <a:t>2019-01-06</a:t>
             </a:fld>
             <a:endParaRPr lang="ko-KR" altLang="en-US"/>
           </a:p>
@@ -5761,1234 +5759,6 @@
 </file>
 
 <file path=ppt/slides/slide3.xml><?xml version="1.0" encoding="utf-8"?>
-<p:sld xmlns:a="http://schemas.openxmlformats.org/drawingml/2006/main" xmlns:r="http://schemas.openxmlformats.org/officeDocument/2006/relationships" xmlns:p="http://schemas.openxmlformats.org/presentationml/2006/main">
-  <p:cSld>
-    <p:spTree>
-      <p:nvGrpSpPr>
-        <p:cNvPr id="1" name=""/>
-        <p:cNvGrpSpPr/>
-        <p:nvPr/>
-      </p:nvGrpSpPr>
-      <p:grpSpPr>
-        <a:xfrm>
-          <a:off x="0" y="0"/>
-          <a:ext cx="0" cy="0"/>
-          <a:chOff x="0" y="0"/>
-          <a:chExt cx="0" cy="0"/>
-        </a:xfrm>
-      </p:grpSpPr>
-      <p:grpSp>
-        <p:nvGrpSpPr>
-          <p:cNvPr id="116" name="그룹 115"/>
-          <p:cNvGrpSpPr/>
-          <p:nvPr/>
-        </p:nvGrpSpPr>
-        <p:grpSpPr>
-          <a:xfrm>
-            <a:off x="2463301" y="2297700"/>
-            <a:ext cx="4216040" cy="2263529"/>
-            <a:chOff x="4134289" y="3179761"/>
-            <a:chExt cx="5621387" cy="3018038"/>
-          </a:xfrm>
-        </p:grpSpPr>
-        <p:sp>
-          <p:nvSpPr>
-            <p:cNvPr id="57" name="모서리가 둥근 직사각형 56"/>
-            <p:cNvSpPr/>
-            <p:nvPr/>
-          </p:nvSpPr>
-          <p:spPr>
-            <a:xfrm>
-              <a:off x="6450488" y="5297799"/>
-              <a:ext cx="1368000" cy="720000"/>
-            </a:xfrm>
-            <a:prstGeom prst="roundRect">
-              <a:avLst/>
-            </a:prstGeom>
-            <a:noFill/>
-            <a:ln>
-              <a:solidFill>
-                <a:schemeClr val="tx1"/>
-              </a:solidFill>
-            </a:ln>
-          </p:spPr>
-          <p:style>
-            <a:lnRef idx="2">
-              <a:schemeClr val="accent1">
-                <a:shade val="50000"/>
-              </a:schemeClr>
-            </a:lnRef>
-            <a:fillRef idx="1">
-              <a:schemeClr val="accent1"/>
-            </a:fillRef>
-            <a:effectRef idx="0">
-              <a:schemeClr val="accent1"/>
-            </a:effectRef>
-            <a:fontRef idx="minor">
-              <a:schemeClr val="lt1"/>
-            </a:fontRef>
-          </p:style>
-          <p:txBody>
-            <a:bodyPr rtlCol="0" anchor="ctr"/>
-            <a:lstStyle/>
-            <a:p>
-              <a:pPr algn="ctr"/>
-              <a:r>
-                <a:rPr lang="en-US" altLang="ko-KR" sz="825" b="1" dirty="0">
-                  <a:solidFill>
-                    <a:schemeClr val="tx1"/>
-                  </a:solidFill>
-                  <a:latin typeface="Times New Roman" panose="02020603050405020304" pitchFamily="18" charset="0"/>
-                  <a:cs typeface="Times New Roman" panose="02020603050405020304" pitchFamily="18" charset="0"/>
-                </a:rPr>
-                <a:t>Global position receiving thread</a:t>
-              </a:r>
-              <a:endParaRPr lang="ko-KR" altLang="en-US" sz="825" b="1" dirty="0">
-                <a:solidFill>
-                  <a:schemeClr val="tx1"/>
-                </a:solidFill>
-                <a:latin typeface="Times New Roman" panose="02020603050405020304" pitchFamily="18" charset="0"/>
-                <a:cs typeface="Times New Roman" panose="02020603050405020304" pitchFamily="18" charset="0"/>
-              </a:endParaRPr>
-            </a:p>
-          </p:txBody>
-        </p:sp>
-        <p:sp>
-          <p:nvSpPr>
-            <p:cNvPr id="58" name="모서리가 둥근 직사각형 57"/>
-            <p:cNvSpPr/>
-            <p:nvPr/>
-          </p:nvSpPr>
-          <p:spPr>
-            <a:xfrm>
-              <a:off x="8315676" y="4345190"/>
-              <a:ext cx="1440000" cy="1080000"/>
-            </a:xfrm>
-            <a:prstGeom prst="roundRect">
-              <a:avLst/>
-            </a:prstGeom>
-            <a:noFill/>
-            <a:ln>
-              <a:solidFill>
-                <a:schemeClr val="tx1"/>
-              </a:solidFill>
-            </a:ln>
-          </p:spPr>
-          <p:style>
-            <a:lnRef idx="2">
-              <a:schemeClr val="accent1">
-                <a:shade val="50000"/>
-              </a:schemeClr>
-            </a:lnRef>
-            <a:fillRef idx="1">
-              <a:schemeClr val="accent1"/>
-            </a:fillRef>
-            <a:effectRef idx="0">
-              <a:schemeClr val="accent1"/>
-            </a:effectRef>
-            <a:fontRef idx="minor">
-              <a:schemeClr val="lt1"/>
-            </a:fontRef>
-          </p:style>
-          <p:txBody>
-            <a:bodyPr rtlCol="0" anchor="ctr"/>
-            <a:lstStyle/>
-            <a:p>
-              <a:pPr algn="ctr"/>
-              <a:r>
-                <a:rPr lang="en-US" altLang="ko-KR" sz="900" b="1" dirty="0">
-                  <a:solidFill>
-                    <a:schemeClr val="tx1"/>
-                  </a:solidFill>
-                  <a:latin typeface="Times New Roman" panose="02020603050405020304" pitchFamily="18" charset="0"/>
-                  <a:cs typeface="Times New Roman" panose="02020603050405020304" pitchFamily="18" charset="0"/>
-                </a:rPr>
-                <a:t>Concatenating</a:t>
-              </a:r>
-            </a:p>
-            <a:p>
-              <a:pPr algn="ctr"/>
-              <a:r>
-                <a:rPr lang="en-US" altLang="ko-KR" sz="900" b="1" dirty="0">
-                  <a:solidFill>
-                    <a:schemeClr val="tx1"/>
-                  </a:solidFill>
-                  <a:latin typeface="Times New Roman" panose="02020603050405020304" pitchFamily="18" charset="0"/>
-                  <a:cs typeface="Times New Roman" panose="02020603050405020304" pitchFamily="18" charset="0"/>
-                </a:rPr>
-                <a:t>and</a:t>
-              </a:r>
-            </a:p>
-            <a:p>
-              <a:pPr algn="ctr"/>
-              <a:r>
-                <a:rPr lang="en-US" altLang="ko-KR" sz="900" b="1" dirty="0">
-                  <a:solidFill>
-                    <a:schemeClr val="tx1"/>
-                  </a:solidFill>
-                  <a:latin typeface="Times New Roman" panose="02020603050405020304" pitchFamily="18" charset="0"/>
-                  <a:cs typeface="Times New Roman" panose="02020603050405020304" pitchFamily="18" charset="0"/>
-                </a:rPr>
-                <a:t>saving thread</a:t>
-              </a:r>
-              <a:endParaRPr lang="ko-KR" altLang="en-US" sz="900" b="1" dirty="0">
-                <a:solidFill>
-                  <a:schemeClr val="tx1"/>
-                </a:solidFill>
-                <a:latin typeface="Times New Roman" panose="02020603050405020304" pitchFamily="18" charset="0"/>
-                <a:cs typeface="Times New Roman" panose="02020603050405020304" pitchFamily="18" charset="0"/>
-              </a:endParaRPr>
-            </a:p>
-          </p:txBody>
-        </p:sp>
-        <p:sp>
-          <p:nvSpPr>
-            <p:cNvPr id="62" name="모서리가 둥근 직사각형 61"/>
-            <p:cNvSpPr/>
-            <p:nvPr/>
-          </p:nvSpPr>
-          <p:spPr>
-            <a:xfrm>
-              <a:off x="6450488" y="3720495"/>
-              <a:ext cx="1368000" cy="720000"/>
-            </a:xfrm>
-            <a:prstGeom prst="roundRect">
-              <a:avLst/>
-            </a:prstGeom>
-            <a:noFill/>
-            <a:ln>
-              <a:solidFill>
-                <a:schemeClr val="tx1"/>
-              </a:solidFill>
-            </a:ln>
-          </p:spPr>
-          <p:style>
-            <a:lnRef idx="2">
-              <a:schemeClr val="accent1">
-                <a:shade val="50000"/>
-              </a:schemeClr>
-            </a:lnRef>
-            <a:fillRef idx="1">
-              <a:schemeClr val="accent1"/>
-            </a:fillRef>
-            <a:effectRef idx="0">
-              <a:schemeClr val="accent1"/>
-            </a:effectRef>
-            <a:fontRef idx="minor">
-              <a:schemeClr val="lt1"/>
-            </a:fontRef>
-          </p:style>
-          <p:txBody>
-            <a:bodyPr rtlCol="0" anchor="ctr"/>
-            <a:lstStyle/>
-            <a:p>
-              <a:pPr algn="ctr"/>
-              <a:r>
-                <a:rPr lang="en-US" altLang="ko-KR" sz="825" b="1" dirty="0">
-                  <a:solidFill>
-                    <a:schemeClr val="tx1"/>
-                  </a:solidFill>
-                  <a:latin typeface="Times New Roman" panose="02020603050405020304" pitchFamily="18" charset="0"/>
-                  <a:cs typeface="Times New Roman" panose="02020603050405020304" pitchFamily="18" charset="0"/>
-                </a:rPr>
-                <a:t>UWB distance receiving thread</a:t>
-              </a:r>
-              <a:endParaRPr lang="ko-KR" altLang="en-US" sz="825" b="1" dirty="0">
-                <a:solidFill>
-                  <a:schemeClr val="tx1"/>
-                </a:solidFill>
-                <a:latin typeface="Times New Roman" panose="02020603050405020304" pitchFamily="18" charset="0"/>
-                <a:cs typeface="Times New Roman" panose="02020603050405020304" pitchFamily="18" charset="0"/>
-              </a:endParaRPr>
-            </a:p>
-          </p:txBody>
-        </p:sp>
-        <p:cxnSp>
-          <p:nvCxnSpPr>
-            <p:cNvPr id="9" name="꺾인 연결선 8"/>
-            <p:cNvCxnSpPr>
-              <a:stCxn id="57" idx="3"/>
-              <a:endCxn id="58" idx="1"/>
-            </p:cNvCxnSpPr>
-            <p:nvPr/>
-          </p:nvCxnSpPr>
-          <p:spPr>
-            <a:xfrm flipV="1">
-              <a:off x="7818488" y="4885190"/>
-              <a:ext cx="497188" cy="772609"/>
-            </a:xfrm>
-            <a:prstGeom prst="bentConnector3">
-              <a:avLst>
-                <a:gd name="adj1" fmla="val 50000"/>
-              </a:avLst>
-            </a:prstGeom>
-            <a:ln>
-              <a:solidFill>
-                <a:schemeClr val="tx1"/>
-              </a:solidFill>
-              <a:tailEnd type="triangle"/>
-            </a:ln>
-          </p:spPr>
-          <p:style>
-            <a:lnRef idx="1">
-              <a:schemeClr val="accent1"/>
-            </a:lnRef>
-            <a:fillRef idx="0">
-              <a:schemeClr val="accent1"/>
-            </a:fillRef>
-            <a:effectRef idx="0">
-              <a:schemeClr val="accent1"/>
-            </a:effectRef>
-            <a:fontRef idx="minor">
-              <a:schemeClr val="tx1"/>
-            </a:fontRef>
-          </p:style>
-        </p:cxnSp>
-        <p:cxnSp>
-          <p:nvCxnSpPr>
-            <p:cNvPr id="11" name="꺾인 연결선 10"/>
-            <p:cNvCxnSpPr>
-              <a:stCxn id="62" idx="3"/>
-              <a:endCxn id="58" idx="1"/>
-            </p:cNvCxnSpPr>
-            <p:nvPr/>
-          </p:nvCxnSpPr>
-          <p:spPr>
-            <a:xfrm>
-              <a:off x="7818488" y="4080495"/>
-              <a:ext cx="497188" cy="804695"/>
-            </a:xfrm>
-            <a:prstGeom prst="bentConnector3">
-              <a:avLst>
-                <a:gd name="adj1" fmla="val 50000"/>
-              </a:avLst>
-            </a:prstGeom>
-            <a:ln>
-              <a:solidFill>
-                <a:schemeClr val="tx1"/>
-              </a:solidFill>
-              <a:tailEnd type="triangle"/>
-            </a:ln>
-          </p:spPr>
-          <p:style>
-            <a:lnRef idx="1">
-              <a:schemeClr val="accent1"/>
-            </a:lnRef>
-            <a:fillRef idx="0">
-              <a:schemeClr val="accent1"/>
-            </a:fillRef>
-            <a:effectRef idx="0">
-              <a:schemeClr val="accent1"/>
-            </a:effectRef>
-            <a:fontRef idx="minor">
-              <a:schemeClr val="tx1"/>
-            </a:fontRef>
-          </p:style>
-        </p:cxnSp>
-        <p:grpSp>
-          <p:nvGrpSpPr>
-            <p:cNvPr id="99" name="그룹 98"/>
-            <p:cNvGrpSpPr/>
-            <p:nvPr/>
-          </p:nvGrpSpPr>
-          <p:grpSpPr>
-            <a:xfrm>
-              <a:off x="5114613" y="3179761"/>
-              <a:ext cx="1132051" cy="1434495"/>
-              <a:chOff x="4213970" y="3179761"/>
-              <a:chExt cx="1132051" cy="1434495"/>
-            </a:xfrm>
-          </p:grpSpPr>
-          <p:pic>
-            <p:nvPicPr>
-              <p:cNvPr id="34" name="그림 33"/>
-              <p:cNvPicPr>
-                <a:picLocks/>
-              </p:cNvPicPr>
-              <p:nvPr/>
-            </p:nvPicPr>
-            <p:blipFill>
-              <a:blip r:embed="rId2" cstate="print">
-                <a:extLst>
-                  <a:ext uri="{28A0092B-C50C-407E-A947-70E740481C1C}">
-                    <a14:useLocalDpi xmlns:a14="http://schemas.microsoft.com/office/drawing/2010/main" val="0"/>
-                  </a:ext>
-                </a:extLst>
-              </a:blip>
-              <a:stretch>
-                <a:fillRect/>
-              </a:stretch>
-            </p:blipFill>
-            <p:spPr>
-              <a:xfrm>
-                <a:off x="4329996" y="3534256"/>
-                <a:ext cx="900000" cy="1080000"/>
-              </a:xfrm>
-              <a:prstGeom prst="rect">
-                <a:avLst/>
-              </a:prstGeom>
-              <a:ln>
-                <a:solidFill>
-                  <a:schemeClr val="tx1"/>
-                </a:solidFill>
-              </a:ln>
-            </p:spPr>
-          </p:pic>
-          <p:sp>
-            <p:nvSpPr>
-              <p:cNvPr id="36" name="타원 35"/>
-              <p:cNvSpPr/>
-              <p:nvPr/>
-            </p:nvSpPr>
-            <p:spPr>
-              <a:xfrm>
-                <a:off x="4559046" y="3533030"/>
-                <a:ext cx="424501" cy="284082"/>
-              </a:xfrm>
-              <a:prstGeom prst="ellipse">
-                <a:avLst/>
-              </a:prstGeom>
-              <a:noFill/>
-              <a:ln w="19050">
-                <a:solidFill>
-                  <a:srgbClr val="002060"/>
-                </a:solidFill>
-              </a:ln>
-            </p:spPr>
-            <p:style>
-              <a:lnRef idx="2">
-                <a:schemeClr val="accent1">
-                  <a:shade val="50000"/>
-                </a:schemeClr>
-              </a:lnRef>
-              <a:fillRef idx="1">
-                <a:schemeClr val="accent1"/>
-              </a:fillRef>
-              <a:effectRef idx="0">
-                <a:schemeClr val="accent1"/>
-              </a:effectRef>
-              <a:fontRef idx="minor">
-                <a:schemeClr val="lt1"/>
-              </a:fontRef>
-            </p:style>
-            <p:txBody>
-              <a:bodyPr rtlCol="0" anchor="ctr"/>
-              <a:lstStyle/>
-              <a:p>
-                <a:pPr algn="ctr"/>
-                <a:endParaRPr lang="ko-KR" altLang="en-US" sz="1350">
-                  <a:latin typeface="Times New Roman" panose="02020603050405020304" pitchFamily="18" charset="0"/>
-                  <a:cs typeface="Times New Roman" panose="02020603050405020304" pitchFamily="18" charset="0"/>
-                </a:endParaRPr>
-              </a:p>
-            </p:txBody>
-          </p:sp>
-          <p:cxnSp>
-            <p:nvCxnSpPr>
-              <p:cNvPr id="37" name="직선 화살표 연결선 36"/>
-              <p:cNvCxnSpPr>
-                <a:stCxn id="36" idx="0"/>
-                <a:endCxn id="38" idx="2"/>
-              </p:cNvCxnSpPr>
-              <p:nvPr/>
-            </p:nvCxnSpPr>
-            <p:spPr>
-              <a:xfrm flipV="1">
-                <a:off x="4771297" y="3472149"/>
-                <a:ext cx="8699" cy="60881"/>
-              </a:xfrm>
-              <a:prstGeom prst="straightConnector1">
-                <a:avLst/>
-              </a:prstGeom>
-              <a:ln>
-                <a:solidFill>
-                  <a:srgbClr val="002060"/>
-                </a:solidFill>
-                <a:tailEnd type="triangle"/>
-              </a:ln>
-            </p:spPr>
-            <p:style>
-              <a:lnRef idx="1">
-                <a:schemeClr val="accent1"/>
-              </a:lnRef>
-              <a:fillRef idx="0">
-                <a:schemeClr val="accent1"/>
-              </a:fillRef>
-              <a:effectRef idx="0">
-                <a:schemeClr val="accent1"/>
-              </a:effectRef>
-              <a:fontRef idx="minor">
-                <a:schemeClr val="tx1"/>
-              </a:fontRef>
-            </p:style>
-          </p:cxnSp>
-          <p:sp>
-            <p:nvSpPr>
-              <p:cNvPr id="38" name="TextBox 37"/>
-              <p:cNvSpPr txBox="1"/>
-              <p:nvPr/>
-            </p:nvSpPr>
-            <p:spPr>
-              <a:xfrm>
-                <a:off x="4213970" y="3179761"/>
-                <a:ext cx="1132051" cy="292388"/>
-              </a:xfrm>
-              <a:prstGeom prst="rect">
-                <a:avLst/>
-              </a:prstGeom>
-              <a:noFill/>
-            </p:spPr>
-            <p:txBody>
-              <a:bodyPr wrap="square" rtlCol="0">
-                <a:spAutoFit/>
-              </a:bodyPr>
-              <a:lstStyle/>
-              <a:p>
-                <a:pPr algn="ctr"/>
-                <a:r>
-                  <a:rPr lang="en-US" altLang="ko-KR" sz="825" dirty="0">
-                    <a:solidFill>
-                      <a:srgbClr val="002060"/>
-                    </a:solidFill>
-                    <a:latin typeface="Times New Roman" panose="02020603050405020304" pitchFamily="18" charset="0"/>
-                    <a:ea typeface="배달의민족 주아" panose="02020603020101020101" pitchFamily="18" charset="-127"/>
-                    <a:cs typeface="Times New Roman" panose="02020603050405020304" pitchFamily="18" charset="0"/>
-                  </a:rPr>
-                  <a:t>UWB tag</a:t>
-                </a:r>
-                <a:endParaRPr lang="ko-KR" altLang="en-US" sz="825" dirty="0">
-                  <a:solidFill>
-                    <a:srgbClr val="002060"/>
-                  </a:solidFill>
-                  <a:latin typeface="Times New Roman" panose="02020603050405020304" pitchFamily="18" charset="0"/>
-                  <a:ea typeface="배달의민족 주아" panose="02020603020101020101" pitchFamily="18" charset="-127"/>
-                  <a:cs typeface="Times New Roman" panose="02020603050405020304" pitchFamily="18" charset="0"/>
-                </a:endParaRPr>
-              </a:p>
-            </p:txBody>
-          </p:sp>
-        </p:grpSp>
-        <p:pic>
-          <p:nvPicPr>
-            <p:cNvPr id="54" name="그림 53"/>
-            <p:cNvPicPr>
-              <a:picLocks/>
-            </p:cNvPicPr>
-            <p:nvPr/>
-          </p:nvPicPr>
-          <p:blipFill>
-            <a:blip r:embed="rId3"/>
-            <a:stretch>
-              <a:fillRect/>
-            </a:stretch>
-          </p:blipFill>
-          <p:spPr>
-            <a:xfrm>
-              <a:off x="4329996" y="5117799"/>
-              <a:ext cx="1800000" cy="1080000"/>
-            </a:xfrm>
-            <a:prstGeom prst="rect">
-              <a:avLst/>
-            </a:prstGeom>
-            <a:ln>
-              <a:solidFill>
-                <a:schemeClr val="tx1"/>
-              </a:solidFill>
-            </a:ln>
-          </p:spPr>
-        </p:pic>
-        <p:sp>
-          <p:nvSpPr>
-            <p:cNvPr id="51" name="직사각형 50"/>
-            <p:cNvSpPr/>
-            <p:nvPr/>
-          </p:nvSpPr>
-          <p:spPr>
-            <a:xfrm>
-              <a:off x="4379657" y="4754385"/>
-              <a:ext cx="1549997" cy="292388"/>
-            </a:xfrm>
-            <a:prstGeom prst="rect">
-              <a:avLst/>
-            </a:prstGeom>
-          </p:spPr>
-          <p:txBody>
-            <a:bodyPr wrap="none">
-              <a:spAutoFit/>
-            </a:bodyPr>
-            <a:lstStyle/>
-            <a:p>
-              <a:pPr algn="ctr"/>
-              <a:r>
-                <a:rPr lang="en-US" altLang="ko-KR" sz="825" dirty="0">
-                  <a:solidFill>
-                    <a:srgbClr val="002060"/>
-                  </a:solidFill>
-                  <a:latin typeface="Times New Roman" panose="02020603050405020304" pitchFamily="18" charset="0"/>
-                  <a:ea typeface="배달의민족 주아"/>
-                  <a:cs typeface="Times New Roman" panose="02020603050405020304" pitchFamily="18" charset="0"/>
-                </a:rPr>
-                <a:t>Motion capture camera</a:t>
-              </a:r>
-              <a:endParaRPr lang="ko-KR" altLang="en-US" sz="825" dirty="0">
-                <a:solidFill>
-                  <a:srgbClr val="002060"/>
-                </a:solidFill>
-                <a:latin typeface="Times New Roman" panose="02020603050405020304" pitchFamily="18" charset="0"/>
-                <a:cs typeface="Times New Roman" panose="02020603050405020304" pitchFamily="18" charset="0"/>
-              </a:endParaRPr>
-            </a:p>
-          </p:txBody>
-        </p:sp>
-        <p:sp>
-          <p:nvSpPr>
-            <p:cNvPr id="52" name="타원 51"/>
-            <p:cNvSpPr/>
-            <p:nvPr/>
-          </p:nvSpPr>
-          <p:spPr>
-            <a:xfrm>
-              <a:off x="5613025" y="5463259"/>
-              <a:ext cx="359059" cy="352846"/>
-            </a:xfrm>
-            <a:prstGeom prst="ellipse">
-              <a:avLst/>
-            </a:prstGeom>
-            <a:noFill/>
-            <a:ln w="19050">
-              <a:solidFill>
-                <a:srgbClr val="002060"/>
-              </a:solidFill>
-            </a:ln>
-          </p:spPr>
-          <p:style>
-            <a:lnRef idx="2">
-              <a:schemeClr val="accent1">
-                <a:shade val="50000"/>
-              </a:schemeClr>
-            </a:lnRef>
-            <a:fillRef idx="1">
-              <a:schemeClr val="accent1"/>
-            </a:fillRef>
-            <a:effectRef idx="0">
-              <a:schemeClr val="accent1"/>
-            </a:effectRef>
-            <a:fontRef idx="minor">
-              <a:schemeClr val="lt1"/>
-            </a:fontRef>
-          </p:style>
-          <p:txBody>
-            <a:bodyPr rtlCol="0" anchor="ctr"/>
-            <a:lstStyle/>
-            <a:p>
-              <a:pPr algn="ctr"/>
-              <a:endParaRPr lang="ko-KR" altLang="en-US" sz="1350">
-                <a:latin typeface="Times New Roman" panose="02020603050405020304" pitchFamily="18" charset="0"/>
-                <a:cs typeface="Times New Roman" panose="02020603050405020304" pitchFamily="18" charset="0"/>
-              </a:endParaRPr>
-            </a:p>
-          </p:txBody>
-        </p:sp>
-        <p:cxnSp>
-          <p:nvCxnSpPr>
-            <p:cNvPr id="53" name="직선 화살표 연결선 52"/>
-            <p:cNvCxnSpPr>
-              <a:stCxn id="52" idx="0"/>
-              <a:endCxn id="51" idx="2"/>
-            </p:cNvCxnSpPr>
-            <p:nvPr/>
-          </p:nvCxnSpPr>
-          <p:spPr>
-            <a:xfrm flipH="1" flipV="1">
-              <a:off x="5154656" y="5046773"/>
-              <a:ext cx="637899" cy="416487"/>
-            </a:xfrm>
-            <a:prstGeom prst="straightConnector1">
-              <a:avLst/>
-            </a:prstGeom>
-            <a:ln>
-              <a:solidFill>
-                <a:srgbClr val="002060"/>
-              </a:solidFill>
-              <a:tailEnd type="triangle"/>
-            </a:ln>
-          </p:spPr>
-          <p:style>
-            <a:lnRef idx="1">
-              <a:schemeClr val="accent1"/>
-            </a:lnRef>
-            <a:fillRef idx="0">
-              <a:schemeClr val="accent1"/>
-            </a:fillRef>
-            <a:effectRef idx="0">
-              <a:schemeClr val="accent1"/>
-            </a:effectRef>
-            <a:fontRef idx="minor">
-              <a:schemeClr val="tx1"/>
-            </a:fontRef>
-          </p:style>
-        </p:cxnSp>
-        <p:cxnSp>
-          <p:nvCxnSpPr>
-            <p:cNvPr id="92" name="직선 화살표 연결선 91"/>
-            <p:cNvCxnSpPr>
-              <a:stCxn id="34" idx="3"/>
-              <a:endCxn id="62" idx="1"/>
-            </p:cNvCxnSpPr>
-            <p:nvPr/>
-          </p:nvCxnSpPr>
-          <p:spPr>
-            <a:xfrm>
-              <a:off x="6130639" y="4074256"/>
-              <a:ext cx="319849" cy="6239"/>
-            </a:xfrm>
-            <a:prstGeom prst="straightConnector1">
-              <a:avLst/>
-            </a:prstGeom>
-            <a:ln w="6350">
-              <a:solidFill>
-                <a:schemeClr val="tx1"/>
-              </a:solidFill>
-              <a:tailEnd type="triangle"/>
-            </a:ln>
-          </p:spPr>
-          <p:style>
-            <a:lnRef idx="1">
-              <a:schemeClr val="accent1"/>
-            </a:lnRef>
-            <a:fillRef idx="0">
-              <a:schemeClr val="accent1"/>
-            </a:fillRef>
-            <a:effectRef idx="0">
-              <a:schemeClr val="accent1"/>
-            </a:effectRef>
-            <a:fontRef idx="minor">
-              <a:schemeClr val="tx1"/>
-            </a:fontRef>
-          </p:style>
-        </p:cxnSp>
-        <p:cxnSp>
-          <p:nvCxnSpPr>
-            <p:cNvPr id="94" name="직선 화살표 연결선 93"/>
-            <p:cNvCxnSpPr>
-              <a:stCxn id="54" idx="3"/>
-              <a:endCxn id="57" idx="1"/>
-            </p:cNvCxnSpPr>
-            <p:nvPr/>
-          </p:nvCxnSpPr>
-          <p:spPr>
-            <a:xfrm>
-              <a:off x="6129996" y="5657799"/>
-              <a:ext cx="320492" cy="0"/>
-            </a:xfrm>
-            <a:prstGeom prst="straightConnector1">
-              <a:avLst/>
-            </a:prstGeom>
-            <a:ln w="6350">
-              <a:solidFill>
-                <a:schemeClr val="tx1"/>
-              </a:solidFill>
-              <a:tailEnd type="triangle"/>
-            </a:ln>
-          </p:spPr>
-          <p:style>
-            <a:lnRef idx="1">
-              <a:schemeClr val="accent1"/>
-            </a:lnRef>
-            <a:fillRef idx="0">
-              <a:schemeClr val="accent1"/>
-            </a:fillRef>
-            <a:effectRef idx="0">
-              <a:schemeClr val="accent1"/>
-            </a:effectRef>
-            <a:fontRef idx="minor">
-              <a:schemeClr val="tx1"/>
-            </a:fontRef>
-          </p:style>
-        </p:cxnSp>
-        <p:cxnSp>
-          <p:nvCxnSpPr>
-            <p:cNvPr id="98" name="직선 연결선 97"/>
-            <p:cNvCxnSpPr>
-              <a:stCxn id="110" idx="3"/>
-              <a:endCxn id="34" idx="1"/>
-            </p:cNvCxnSpPr>
-            <p:nvPr/>
-          </p:nvCxnSpPr>
-          <p:spPr>
-            <a:xfrm>
-              <a:off x="5042143" y="4074256"/>
-              <a:ext cx="188496" cy="0"/>
-            </a:xfrm>
-            <a:prstGeom prst="line">
-              <a:avLst/>
-            </a:prstGeom>
-            <a:ln>
-              <a:solidFill>
-                <a:schemeClr val="tx1"/>
-              </a:solidFill>
-            </a:ln>
-          </p:spPr>
-          <p:style>
-            <a:lnRef idx="1">
-              <a:schemeClr val="accent1"/>
-            </a:lnRef>
-            <a:fillRef idx="0">
-              <a:schemeClr val="accent1"/>
-            </a:fillRef>
-            <a:effectRef idx="0">
-              <a:schemeClr val="accent1"/>
-            </a:effectRef>
-            <a:fontRef idx="minor">
-              <a:schemeClr val="tx1"/>
-            </a:fontRef>
-          </p:style>
-        </p:cxnSp>
-        <p:grpSp>
-          <p:nvGrpSpPr>
-            <p:cNvPr id="109" name="그룹 108"/>
-            <p:cNvGrpSpPr/>
-            <p:nvPr/>
-          </p:nvGrpSpPr>
-          <p:grpSpPr>
-            <a:xfrm>
-              <a:off x="4134289" y="3179761"/>
-              <a:ext cx="1095707" cy="1434495"/>
-              <a:chOff x="5222142" y="3179761"/>
-              <a:chExt cx="1095707" cy="1434495"/>
-            </a:xfrm>
-          </p:grpSpPr>
-          <p:pic>
-            <p:nvPicPr>
-              <p:cNvPr id="110" name="그림 109"/>
-              <p:cNvPicPr>
-                <a:picLocks/>
-              </p:cNvPicPr>
-              <p:nvPr/>
-            </p:nvPicPr>
-            <p:blipFill>
-              <a:blip r:embed="rId4" cstate="print">
-                <a:extLst>
-                  <a:ext uri="{28A0092B-C50C-407E-A947-70E740481C1C}">
-                    <a14:useLocalDpi xmlns:a14="http://schemas.microsoft.com/office/drawing/2010/main" val="0"/>
-                  </a:ext>
-                </a:extLst>
-              </a:blip>
-              <a:stretch>
-                <a:fillRect/>
-              </a:stretch>
-            </p:blipFill>
-            <p:spPr>
-              <a:xfrm>
-                <a:off x="5409996" y="3534256"/>
-                <a:ext cx="720000" cy="1080000"/>
-              </a:xfrm>
-              <a:prstGeom prst="rect">
-                <a:avLst/>
-              </a:prstGeom>
-              <a:ln>
-                <a:solidFill>
-                  <a:schemeClr val="tx1"/>
-                </a:solidFill>
-              </a:ln>
-            </p:spPr>
-          </p:pic>
-          <p:sp>
-            <p:nvSpPr>
-              <p:cNvPr id="111" name="타원 110"/>
-              <p:cNvSpPr/>
-              <p:nvPr/>
-            </p:nvSpPr>
-            <p:spPr>
-              <a:xfrm>
-                <a:off x="5567273" y="3633434"/>
-                <a:ext cx="403264" cy="274172"/>
-              </a:xfrm>
-              <a:prstGeom prst="ellipse">
-                <a:avLst/>
-              </a:prstGeom>
-              <a:noFill/>
-              <a:ln w="19050">
-                <a:solidFill>
-                  <a:srgbClr val="002060"/>
-                </a:solidFill>
-              </a:ln>
-            </p:spPr>
-            <p:style>
-              <a:lnRef idx="2">
-                <a:schemeClr val="accent1">
-                  <a:shade val="50000"/>
-                </a:schemeClr>
-              </a:lnRef>
-              <a:fillRef idx="1">
-                <a:schemeClr val="accent1"/>
-              </a:fillRef>
-              <a:effectRef idx="0">
-                <a:schemeClr val="accent1"/>
-              </a:effectRef>
-              <a:fontRef idx="minor">
-                <a:schemeClr val="lt1"/>
-              </a:fontRef>
-            </p:style>
-            <p:txBody>
-              <a:bodyPr rtlCol="0" anchor="ctr"/>
-              <a:lstStyle/>
-              <a:p>
-                <a:pPr algn="ctr"/>
-                <a:endParaRPr lang="ko-KR" altLang="en-US" sz="1350">
-                  <a:latin typeface="Times New Roman" panose="02020603050405020304" pitchFamily="18" charset="0"/>
-                  <a:cs typeface="Times New Roman" panose="02020603050405020304" pitchFamily="18" charset="0"/>
-                </a:endParaRPr>
-              </a:p>
-            </p:txBody>
-          </p:sp>
-          <p:sp>
-            <p:nvSpPr>
-              <p:cNvPr id="112" name="TextBox 111"/>
-              <p:cNvSpPr txBox="1"/>
-              <p:nvPr/>
-            </p:nvSpPr>
-            <p:spPr>
-              <a:xfrm>
-                <a:off x="5222142" y="3179761"/>
-                <a:ext cx="1095707" cy="292388"/>
-              </a:xfrm>
-              <a:prstGeom prst="rect">
-                <a:avLst/>
-              </a:prstGeom>
-              <a:noFill/>
-            </p:spPr>
-            <p:txBody>
-              <a:bodyPr wrap="square" rtlCol="0">
-                <a:spAutoFit/>
-              </a:bodyPr>
-              <a:lstStyle/>
-              <a:p>
-                <a:pPr algn="ctr"/>
-                <a:r>
-                  <a:rPr lang="en-US" altLang="ko-KR" sz="825" dirty="0">
-                    <a:solidFill>
-                      <a:srgbClr val="002060"/>
-                    </a:solidFill>
-                    <a:latin typeface="Times New Roman" panose="02020603050405020304" pitchFamily="18" charset="0"/>
-                    <a:ea typeface="배달의민족 주아" panose="02020603020101020101" pitchFamily="18" charset="-127"/>
-                    <a:cs typeface="Times New Roman" panose="02020603050405020304" pitchFamily="18" charset="0"/>
-                  </a:rPr>
-                  <a:t>UWB anchor</a:t>
-                </a:r>
-                <a:endParaRPr lang="ko-KR" altLang="en-US" sz="825" dirty="0">
-                  <a:solidFill>
-                    <a:srgbClr val="002060"/>
-                  </a:solidFill>
-                  <a:latin typeface="Times New Roman" panose="02020603050405020304" pitchFamily="18" charset="0"/>
-                  <a:ea typeface="배달의민족 주아" panose="02020603020101020101" pitchFamily="18" charset="-127"/>
-                  <a:cs typeface="Times New Roman" panose="02020603050405020304" pitchFamily="18" charset="0"/>
-                </a:endParaRPr>
-              </a:p>
-            </p:txBody>
-          </p:sp>
-          <p:cxnSp>
-            <p:nvCxnSpPr>
-              <p:cNvPr id="113" name="직선 화살표 연결선 112"/>
-              <p:cNvCxnSpPr>
-                <a:stCxn id="111" idx="0"/>
-                <a:endCxn id="112" idx="2"/>
-              </p:cNvCxnSpPr>
-              <p:nvPr/>
-            </p:nvCxnSpPr>
-            <p:spPr>
-              <a:xfrm flipV="1">
-                <a:off x="5768905" y="3472149"/>
-                <a:ext cx="1091" cy="161285"/>
-              </a:xfrm>
-              <a:prstGeom prst="straightConnector1">
-                <a:avLst/>
-              </a:prstGeom>
-              <a:ln>
-                <a:solidFill>
-                  <a:srgbClr val="002060"/>
-                </a:solidFill>
-                <a:tailEnd type="triangle"/>
-              </a:ln>
-            </p:spPr>
-            <p:style>
-              <a:lnRef idx="1">
-                <a:schemeClr val="accent1"/>
-              </a:lnRef>
-              <a:fillRef idx="0">
-                <a:schemeClr val="accent1"/>
-              </a:fillRef>
-              <a:effectRef idx="0">
-                <a:schemeClr val="accent1"/>
-              </a:effectRef>
-              <a:fontRef idx="minor">
-                <a:schemeClr val="tx1"/>
-              </a:fontRef>
-            </p:style>
-          </p:cxnSp>
-        </p:grpSp>
-      </p:grpSp>
-    </p:spTree>
-    <p:extLst>
-      <p:ext uri="{BB962C8B-B14F-4D97-AF65-F5344CB8AC3E}">
-        <p14:creationId xmlns:p14="http://schemas.microsoft.com/office/powerpoint/2010/main" val="3783132296"/>
-      </p:ext>
-    </p:extLst>
-  </p:cSld>
-  <p:clrMapOvr>
-    <a:masterClrMapping/>
-  </p:clrMapOvr>
-  <p:timing>
-    <p:tnLst>
-      <p:par>
-        <p:cTn id="1" dur="indefinite" restart="never" nodeType="tmRoot"/>
-      </p:par>
-    </p:tnLst>
-  </p:timing>
-</p:sld>
-</file>
-
-<file path=ppt/slides/slide4.xml><?xml version="1.0" encoding="utf-8"?>
-<p:sld xmlns:a="http://schemas.openxmlformats.org/drawingml/2006/main" xmlns:r="http://schemas.openxmlformats.org/officeDocument/2006/relationships" xmlns:p="http://schemas.openxmlformats.org/presentationml/2006/main">
-  <p:cSld>
-    <p:spTree>
-      <p:nvGrpSpPr>
-        <p:cNvPr id="1" name=""/>
-        <p:cNvGrpSpPr/>
-        <p:nvPr/>
-      </p:nvGrpSpPr>
-      <p:grpSpPr>
-        <a:xfrm>
-          <a:off x="0" y="0"/>
-          <a:ext cx="0" cy="0"/>
-          <a:chOff x="0" y="0"/>
-          <a:chExt cx="0" cy="0"/>
-        </a:xfrm>
-      </p:grpSpPr>
-      <p:grpSp>
-        <p:nvGrpSpPr>
-          <p:cNvPr id="4" name="그룹 3"/>
-          <p:cNvGrpSpPr/>
-          <p:nvPr/>
-        </p:nvGrpSpPr>
-        <p:grpSpPr>
-          <a:xfrm>
-            <a:off x="2142000" y="1285201"/>
-            <a:ext cx="4860458" cy="4286612"/>
-            <a:chOff x="719390" y="297759"/>
-            <a:chExt cx="6480610" cy="5715483"/>
-          </a:xfrm>
-        </p:grpSpPr>
-        <p:grpSp>
-          <p:nvGrpSpPr>
-            <p:cNvPr id="3" name="그룹 2"/>
-            <p:cNvGrpSpPr/>
-            <p:nvPr/>
-          </p:nvGrpSpPr>
-          <p:grpSpPr>
-            <a:xfrm>
-              <a:off x="3423310" y="5833242"/>
-              <a:ext cx="1073380" cy="180000"/>
-              <a:chOff x="3415862" y="5665076"/>
-              <a:chExt cx="1073380" cy="180000"/>
-            </a:xfrm>
-          </p:grpSpPr>
-          <p:sp>
-            <p:nvSpPr>
-              <p:cNvPr id="2" name="타원 1"/>
-              <p:cNvSpPr/>
-              <p:nvPr/>
-            </p:nvSpPr>
-            <p:spPr>
-              <a:xfrm>
-                <a:off x="3415862" y="5665076"/>
-                <a:ext cx="180000" cy="180000"/>
-              </a:xfrm>
-              <a:prstGeom prst="ellipse">
-                <a:avLst/>
-              </a:prstGeom>
-              <a:solidFill>
-                <a:schemeClr val="tx1"/>
-              </a:solidFill>
-              <a:ln>
-                <a:solidFill>
-                  <a:schemeClr val="tx1"/>
-                </a:solidFill>
-              </a:ln>
-            </p:spPr>
-            <p:style>
-              <a:lnRef idx="2">
-                <a:schemeClr val="accent1">
-                  <a:shade val="50000"/>
-                </a:schemeClr>
-              </a:lnRef>
-              <a:fillRef idx="1">
-                <a:schemeClr val="accent1"/>
-              </a:fillRef>
-              <a:effectRef idx="0">
-                <a:schemeClr val="accent1"/>
-              </a:effectRef>
-              <a:fontRef idx="minor">
-                <a:schemeClr val="lt1"/>
-              </a:fontRef>
-            </p:style>
-            <p:txBody>
-              <a:bodyPr rtlCol="0" anchor="ctr"/>
-              <a:lstStyle/>
-              <a:p>
-                <a:pPr algn="ctr"/>
-                <a:endParaRPr lang="ko-KR" altLang="en-US" sz="1350"/>
-              </a:p>
-            </p:txBody>
-          </p:sp>
-          <p:sp>
-            <p:nvSpPr>
-              <p:cNvPr id="8" name="타원 7"/>
-              <p:cNvSpPr/>
-              <p:nvPr/>
-            </p:nvSpPr>
-            <p:spPr>
-              <a:xfrm>
-                <a:off x="3862552" y="5665076"/>
-                <a:ext cx="180000" cy="180000"/>
-              </a:xfrm>
-              <a:prstGeom prst="ellipse">
-                <a:avLst/>
-              </a:prstGeom>
-              <a:solidFill>
-                <a:schemeClr val="tx1"/>
-              </a:solidFill>
-              <a:ln>
-                <a:solidFill>
-                  <a:schemeClr val="tx1"/>
-                </a:solidFill>
-              </a:ln>
-            </p:spPr>
-            <p:style>
-              <a:lnRef idx="2">
-                <a:schemeClr val="accent1">
-                  <a:shade val="50000"/>
-                </a:schemeClr>
-              </a:lnRef>
-              <a:fillRef idx="1">
-                <a:schemeClr val="accent1"/>
-              </a:fillRef>
-              <a:effectRef idx="0">
-                <a:schemeClr val="accent1"/>
-              </a:effectRef>
-              <a:fontRef idx="minor">
-                <a:schemeClr val="lt1"/>
-              </a:fontRef>
-            </p:style>
-            <p:txBody>
-              <a:bodyPr rtlCol="0" anchor="ctr"/>
-              <a:lstStyle/>
-              <a:p>
-                <a:pPr algn="ctr"/>
-                <a:endParaRPr lang="ko-KR" altLang="en-US" sz="1350"/>
-              </a:p>
-            </p:txBody>
-          </p:sp>
-          <p:sp>
-            <p:nvSpPr>
-              <p:cNvPr id="9" name="타원 8"/>
-              <p:cNvSpPr/>
-              <p:nvPr/>
-            </p:nvSpPr>
-            <p:spPr>
-              <a:xfrm>
-                <a:off x="4309242" y="5665076"/>
-                <a:ext cx="180000" cy="180000"/>
-              </a:xfrm>
-              <a:prstGeom prst="ellipse">
-                <a:avLst/>
-              </a:prstGeom>
-              <a:solidFill>
-                <a:schemeClr val="tx1"/>
-              </a:solidFill>
-              <a:ln>
-                <a:solidFill>
-                  <a:schemeClr val="tx1"/>
-                </a:solidFill>
-              </a:ln>
-            </p:spPr>
-            <p:style>
-              <a:lnRef idx="2">
-                <a:schemeClr val="accent1">
-                  <a:shade val="50000"/>
-                </a:schemeClr>
-              </a:lnRef>
-              <a:fillRef idx="1">
-                <a:schemeClr val="accent1"/>
-              </a:fillRef>
-              <a:effectRef idx="0">
-                <a:schemeClr val="accent1"/>
-              </a:effectRef>
-              <a:fontRef idx="minor">
-                <a:schemeClr val="lt1"/>
-              </a:fontRef>
-            </p:style>
-            <p:txBody>
-              <a:bodyPr rtlCol="0" anchor="ctr"/>
-              <a:lstStyle/>
-              <a:p>
-                <a:pPr algn="ctr"/>
-                <a:endParaRPr lang="ko-KR" altLang="en-US" sz="1350"/>
-              </a:p>
-            </p:txBody>
-          </p:sp>
-        </p:grpSp>
-        <p:pic>
-          <p:nvPicPr>
-            <p:cNvPr id="17" name="그림 16"/>
-            <p:cNvPicPr>
-              <a:picLocks noChangeAspect="1"/>
-            </p:cNvPicPr>
-            <p:nvPr/>
-          </p:nvPicPr>
-          <p:blipFill>
-            <a:blip r:embed="rId2">
-              <a:extLst>
-                <a:ext uri="{BEBA8EAE-BF5A-486C-A8C5-ECC9F3942E4B}">
-                  <a14:imgProps xmlns:a14="http://schemas.microsoft.com/office/drawing/2010/main">
-                    <a14:imgLayer r:embed="rId3">
-                      <a14:imgEffect>
-                        <a14:artisticPhotocopy/>
-                      </a14:imgEffect>
-                    </a14:imgLayer>
-                  </a14:imgProps>
-                </a:ext>
-              </a:extLst>
-            </a:blip>
-            <a:stretch>
-              <a:fillRect/>
-            </a:stretch>
-          </p:blipFill>
-          <p:spPr>
-            <a:xfrm>
-              <a:off x="719390" y="297759"/>
-              <a:ext cx="6480610" cy="5041829"/>
-            </a:xfrm>
-            <a:prstGeom prst="rect">
-              <a:avLst/>
-            </a:prstGeom>
-          </p:spPr>
-        </p:pic>
-      </p:grpSp>
-    </p:spTree>
-    <p:extLst>
-      <p:ext uri="{BB962C8B-B14F-4D97-AF65-F5344CB8AC3E}">
-        <p14:creationId xmlns:p14="http://schemas.microsoft.com/office/powerpoint/2010/main" val="1043437216"/>
-      </p:ext>
-    </p:extLst>
-  </p:cSld>
-  <p:clrMapOvr>
-    <a:masterClrMapping/>
-  </p:clrMapOvr>
-</p:sld>
-</file>
-
-<file path=ppt/slides/slide5.xml><?xml version="1.0" encoding="utf-8"?>
 <p:sld xmlns:a="http://schemas.openxmlformats.org/drawingml/2006/main" xmlns:r="http://schemas.openxmlformats.org/officeDocument/2006/relationships" xmlns:p="http://schemas.openxmlformats.org/presentationml/2006/main">
   <p:cSld>
     <p:spTree>

</xml_diff>